<commit_message>
#27 Encore le face tracker #CaMarchePas #PasDeFace #Qualité
</commit_message>
<xml_diff>
--- a/Documentations/RemiseMiSession/Présentation_simon.pptx
+++ b/Documentations/RemiseMiSession/Présentation_simon.pptx
@@ -146,7 +146,7 @@
           <a:blip r:embed="rId2" cstate="print">
             <a:extLst>
               <a:ext uri="{28A0092B-C50C-407E-A947-70E740481C1C}">
-                <a14:useLocalDpi xmlns:a14="http://schemas.microsoft.com/office/drawing/2010/main" xmlns="" val="0"/>
+                <a14:useLocalDpi xmlns="" xmlns:a14="http://schemas.microsoft.com/office/drawing/2010/main" val="0"/>
               </a:ext>
             </a:extLst>
           </a:blip>
@@ -288,7 +288,7 @@
             <a:fld id="{2CB6698F-CC9F-4277-8973-E5BAFD0BEC27}" type="datetimeFigureOut">
               <a:rPr lang="fr-CA" smtClean="0"/>
               <a:pPr/>
-              <a:t>2014-02-18</a:t>
+              <a:t>2014-02-19</a:t>
             </a:fld>
             <a:endParaRPr lang="fr-CA"/>
           </a:p>
@@ -350,7 +350,7 @@
     </p:spTree>
     <p:extLst>
       <p:ext uri="{BB962C8B-B14F-4D97-AF65-F5344CB8AC3E}">
-        <p14:creationId xmlns:p14="http://schemas.microsoft.com/office/powerpoint/2010/main" xmlns="" val="392403108"/>
+        <p14:creationId xmlns="" xmlns:p14="http://schemas.microsoft.com/office/powerpoint/2010/main" val="392403108"/>
       </p:ext>
     </p:extLst>
   </p:cSld>
@@ -557,7 +557,7 @@
             <a:fld id="{2CB6698F-CC9F-4277-8973-E5BAFD0BEC27}" type="datetimeFigureOut">
               <a:rPr lang="fr-CA" smtClean="0"/>
               <a:pPr/>
-              <a:t>2014-02-18</a:t>
+              <a:t>2014-02-19</a:t>
             </a:fld>
             <a:endParaRPr lang="fr-CA"/>
           </a:p>
@@ -609,7 +609,7 @@
     </p:spTree>
     <p:extLst>
       <p:ext uri="{BB962C8B-B14F-4D97-AF65-F5344CB8AC3E}">
-        <p14:creationId xmlns:p14="http://schemas.microsoft.com/office/powerpoint/2010/main" xmlns="" val="1266225301"/>
+        <p14:creationId xmlns="" xmlns:p14="http://schemas.microsoft.com/office/powerpoint/2010/main" val="1266225301"/>
       </p:ext>
     </p:extLst>
   </p:cSld>
@@ -648,7 +648,7 @@
           <a:blip r:embed="rId2" cstate="print">
             <a:extLst>
               <a:ext uri="{28A0092B-C50C-407E-A947-70E740481C1C}">
-                <a14:useLocalDpi xmlns:a14="http://schemas.microsoft.com/office/drawing/2010/main" xmlns="" val="0"/>
+                <a14:useLocalDpi xmlns="" xmlns:a14="http://schemas.microsoft.com/office/drawing/2010/main" val="0"/>
               </a:ext>
             </a:extLst>
           </a:blip>
@@ -790,7 +790,7 @@
             <a:fld id="{2CB6698F-CC9F-4277-8973-E5BAFD0BEC27}" type="datetimeFigureOut">
               <a:rPr lang="fr-CA" smtClean="0"/>
               <a:pPr/>
-              <a:t>2014-02-18</a:t>
+              <a:t>2014-02-19</a:t>
             </a:fld>
             <a:endParaRPr lang="fr-CA"/>
           </a:p>
@@ -852,7 +852,7 @@
     </p:spTree>
     <p:extLst>
       <p:ext uri="{BB962C8B-B14F-4D97-AF65-F5344CB8AC3E}">
-        <p14:creationId xmlns:p14="http://schemas.microsoft.com/office/powerpoint/2010/main" xmlns="" val="2058214671"/>
+        <p14:creationId xmlns="" xmlns:p14="http://schemas.microsoft.com/office/powerpoint/2010/main" val="2058214671"/>
       </p:ext>
     </p:extLst>
   </p:cSld>
@@ -891,7 +891,7 @@
           <a:blip r:embed="rId2" cstate="print">
             <a:extLst>
               <a:ext uri="{28A0092B-C50C-407E-A947-70E740481C1C}">
-                <a14:useLocalDpi xmlns:a14="http://schemas.microsoft.com/office/drawing/2010/main" xmlns="" val="0"/>
+                <a14:useLocalDpi xmlns="" xmlns:a14="http://schemas.microsoft.com/office/drawing/2010/main" val="0"/>
               </a:ext>
             </a:extLst>
           </a:blip>
@@ -1102,7 +1102,7 @@
             <a:fld id="{2CB6698F-CC9F-4277-8973-E5BAFD0BEC27}" type="datetimeFigureOut">
               <a:rPr lang="fr-CA" smtClean="0"/>
               <a:pPr/>
-              <a:t>2014-02-18</a:t>
+              <a:t>2014-02-19</a:t>
             </a:fld>
             <a:endParaRPr lang="fr-CA"/>
           </a:p>
@@ -1396,7 +1396,7 @@
     </p:spTree>
     <p:extLst>
       <p:ext uri="{BB962C8B-B14F-4D97-AF65-F5344CB8AC3E}">
-        <p14:creationId xmlns:p14="http://schemas.microsoft.com/office/powerpoint/2010/main" xmlns="" val="831968410"/>
+        <p14:creationId xmlns="" xmlns:p14="http://schemas.microsoft.com/office/powerpoint/2010/main" val="831968410"/>
       </p:ext>
     </p:extLst>
   </p:cSld>
@@ -1435,7 +1435,7 @@
           <a:blip r:embed="rId2" cstate="print">
             <a:extLst>
               <a:ext uri="{28A0092B-C50C-407E-A947-70E740481C1C}">
-                <a14:useLocalDpi xmlns:a14="http://schemas.microsoft.com/office/drawing/2010/main" xmlns="" val="0"/>
+                <a14:useLocalDpi xmlns="" xmlns:a14="http://schemas.microsoft.com/office/drawing/2010/main" val="0"/>
               </a:ext>
             </a:extLst>
           </a:blip>
@@ -1577,7 +1577,7 @@
             <a:fld id="{2CB6698F-CC9F-4277-8973-E5BAFD0BEC27}" type="datetimeFigureOut">
               <a:rPr lang="fr-CA" smtClean="0"/>
               <a:pPr/>
-              <a:t>2014-02-18</a:t>
+              <a:t>2014-02-19</a:t>
             </a:fld>
             <a:endParaRPr lang="fr-CA"/>
           </a:p>
@@ -1639,7 +1639,7 @@
     </p:spTree>
     <p:extLst>
       <p:ext uri="{BB962C8B-B14F-4D97-AF65-F5344CB8AC3E}">
-        <p14:creationId xmlns:p14="http://schemas.microsoft.com/office/powerpoint/2010/main" xmlns="" val="4047454916"/>
+        <p14:creationId xmlns="" xmlns:p14="http://schemas.microsoft.com/office/powerpoint/2010/main" val="4047454916"/>
       </p:ext>
     </p:extLst>
   </p:cSld>
@@ -2126,7 +2126,7 @@
             <a:fld id="{2CB6698F-CC9F-4277-8973-E5BAFD0BEC27}" type="datetimeFigureOut">
               <a:rPr lang="fr-CA" smtClean="0"/>
               <a:pPr/>
-              <a:t>2014-02-18</a:t>
+              <a:t>2014-02-19</a:t>
             </a:fld>
             <a:endParaRPr lang="fr-CA"/>
           </a:p>
@@ -2178,7 +2178,7 @@
     </p:spTree>
     <p:extLst>
       <p:ext uri="{BB962C8B-B14F-4D97-AF65-F5344CB8AC3E}">
-        <p14:creationId xmlns:p14="http://schemas.microsoft.com/office/powerpoint/2010/main" xmlns="" val="770088167"/>
+        <p14:creationId xmlns="" xmlns:p14="http://schemas.microsoft.com/office/powerpoint/2010/main" val="770088167"/>
       </p:ext>
     </p:extLst>
   </p:cSld>
@@ -2902,7 +2902,7 @@
             <a:fld id="{2CB6698F-CC9F-4277-8973-E5BAFD0BEC27}" type="datetimeFigureOut">
               <a:rPr lang="fr-CA" smtClean="0"/>
               <a:pPr/>
-              <a:t>2014-02-18</a:t>
+              <a:t>2014-02-19</a:t>
             </a:fld>
             <a:endParaRPr lang="fr-CA"/>
           </a:p>
@@ -2954,7 +2954,7 @@
     </p:spTree>
     <p:extLst>
       <p:ext uri="{BB962C8B-B14F-4D97-AF65-F5344CB8AC3E}">
-        <p14:creationId xmlns:p14="http://schemas.microsoft.com/office/powerpoint/2010/main" xmlns="" val="2027649275"/>
+        <p14:creationId xmlns="" xmlns:p14="http://schemas.microsoft.com/office/powerpoint/2010/main" val="2027649275"/>
       </p:ext>
     </p:extLst>
   </p:cSld>
@@ -3079,7 +3079,7 @@
             <a:fld id="{2CB6698F-CC9F-4277-8973-E5BAFD0BEC27}" type="datetimeFigureOut">
               <a:rPr lang="fr-CA" smtClean="0"/>
               <a:pPr/>
-              <a:t>2014-02-18</a:t>
+              <a:t>2014-02-19</a:t>
             </a:fld>
             <a:endParaRPr lang="fr-CA"/>
           </a:p>
@@ -3131,7 +3131,7 @@
     </p:spTree>
     <p:extLst>
       <p:ext uri="{BB962C8B-B14F-4D97-AF65-F5344CB8AC3E}">
-        <p14:creationId xmlns:p14="http://schemas.microsoft.com/office/powerpoint/2010/main" xmlns="" val="2969383019"/>
+        <p14:creationId xmlns="" xmlns:p14="http://schemas.microsoft.com/office/powerpoint/2010/main" val="2969383019"/>
       </p:ext>
     </p:extLst>
   </p:cSld>
@@ -3170,7 +3170,7 @@
           <a:blip r:embed="rId2" cstate="print">
             <a:extLst>
               <a:ext uri="{28A0092B-C50C-407E-A947-70E740481C1C}">
-                <a14:useLocalDpi xmlns:a14="http://schemas.microsoft.com/office/drawing/2010/main" xmlns="" val="0"/>
+                <a14:useLocalDpi xmlns="" xmlns:a14="http://schemas.microsoft.com/office/drawing/2010/main" val="0"/>
               </a:ext>
             </a:extLst>
           </a:blip>
@@ -3304,7 +3304,7 @@
             <a:fld id="{2CB6698F-CC9F-4277-8973-E5BAFD0BEC27}" type="datetimeFigureOut">
               <a:rPr lang="fr-CA" smtClean="0"/>
               <a:pPr/>
-              <a:t>2014-02-18</a:t>
+              <a:t>2014-02-19</a:t>
             </a:fld>
             <a:endParaRPr lang="fr-CA"/>
           </a:p>
@@ -3366,7 +3366,7 @@
     </p:spTree>
     <p:extLst>
       <p:ext uri="{BB962C8B-B14F-4D97-AF65-F5344CB8AC3E}">
-        <p14:creationId xmlns:p14="http://schemas.microsoft.com/office/powerpoint/2010/main" xmlns="" val="857014664"/>
+        <p14:creationId xmlns="" xmlns:p14="http://schemas.microsoft.com/office/powerpoint/2010/main" val="857014664"/>
       </p:ext>
     </p:extLst>
   </p:cSld>
@@ -3486,7 +3486,7 @@
             <a:fld id="{2CB6698F-CC9F-4277-8973-E5BAFD0BEC27}" type="datetimeFigureOut">
               <a:rPr lang="fr-CA" smtClean="0"/>
               <a:pPr/>
-              <a:t>2014-02-18</a:t>
+              <a:t>2014-02-19</a:t>
             </a:fld>
             <a:endParaRPr lang="fr-CA"/>
           </a:p>
@@ -3538,7 +3538,7 @@
     </p:spTree>
     <p:extLst>
       <p:ext uri="{BB962C8B-B14F-4D97-AF65-F5344CB8AC3E}">
-        <p14:creationId xmlns:p14="http://schemas.microsoft.com/office/powerpoint/2010/main" xmlns="" val="1550806562"/>
+        <p14:creationId xmlns="" xmlns:p14="http://schemas.microsoft.com/office/powerpoint/2010/main" val="1550806562"/>
       </p:ext>
     </p:extLst>
   </p:cSld>
@@ -3577,7 +3577,7 @@
           <a:blip r:embed="rId2" cstate="print">
             <a:extLst>
               <a:ext uri="{28A0092B-C50C-407E-A947-70E740481C1C}">
-                <a14:useLocalDpi xmlns:a14="http://schemas.microsoft.com/office/drawing/2010/main" xmlns="" val="0"/>
+                <a14:useLocalDpi xmlns="" xmlns:a14="http://schemas.microsoft.com/office/drawing/2010/main" val="0"/>
               </a:ext>
             </a:extLst>
           </a:blip>
@@ -3777,7 +3777,7 @@
             <a:fld id="{2CB6698F-CC9F-4277-8973-E5BAFD0BEC27}" type="datetimeFigureOut">
               <a:rPr lang="fr-CA" smtClean="0"/>
               <a:pPr/>
-              <a:t>2014-02-18</a:t>
+              <a:t>2014-02-19</a:t>
             </a:fld>
             <a:endParaRPr lang="fr-CA"/>
           </a:p>
@@ -3839,7 +3839,7 @@
     </p:spTree>
     <p:extLst>
       <p:ext uri="{BB962C8B-B14F-4D97-AF65-F5344CB8AC3E}">
-        <p14:creationId xmlns:p14="http://schemas.microsoft.com/office/powerpoint/2010/main" xmlns="" val="2078274605"/>
+        <p14:creationId xmlns="" xmlns:p14="http://schemas.microsoft.com/office/powerpoint/2010/main" val="2078274605"/>
       </p:ext>
     </p:extLst>
   </p:cSld>
@@ -4021,7 +4021,7 @@
             <a:fld id="{2CB6698F-CC9F-4277-8973-E5BAFD0BEC27}" type="datetimeFigureOut">
               <a:rPr lang="fr-CA" smtClean="0"/>
               <a:pPr/>
-              <a:t>2014-02-18</a:t>
+              <a:t>2014-02-19</a:t>
             </a:fld>
             <a:endParaRPr lang="fr-CA"/>
           </a:p>
@@ -4073,7 +4073,7 @@
     </p:spTree>
     <p:extLst>
       <p:ext uri="{BB962C8B-B14F-4D97-AF65-F5344CB8AC3E}">
-        <p14:creationId xmlns:p14="http://schemas.microsoft.com/office/powerpoint/2010/main" xmlns="" val="3646090101"/>
+        <p14:creationId xmlns="" xmlns:p14="http://schemas.microsoft.com/office/powerpoint/2010/main" val="3646090101"/>
       </p:ext>
     </p:extLst>
   </p:cSld>
@@ -4402,7 +4402,7 @@
             <a:fld id="{2CB6698F-CC9F-4277-8973-E5BAFD0BEC27}" type="datetimeFigureOut">
               <a:rPr lang="fr-CA" smtClean="0"/>
               <a:pPr/>
-              <a:t>2014-02-18</a:t>
+              <a:t>2014-02-19</a:t>
             </a:fld>
             <a:endParaRPr lang="fr-CA"/>
           </a:p>
@@ -4454,7 +4454,7 @@
     </p:spTree>
     <p:extLst>
       <p:ext uri="{BB962C8B-B14F-4D97-AF65-F5344CB8AC3E}">
-        <p14:creationId xmlns:p14="http://schemas.microsoft.com/office/powerpoint/2010/main" xmlns="" val="2264088492"/>
+        <p14:creationId xmlns="" xmlns:p14="http://schemas.microsoft.com/office/powerpoint/2010/main" val="2264088492"/>
       </p:ext>
     </p:extLst>
   </p:cSld>
@@ -4522,7 +4522,7 @@
             <a:fld id="{2CB6698F-CC9F-4277-8973-E5BAFD0BEC27}" type="datetimeFigureOut">
               <a:rPr lang="fr-CA" smtClean="0"/>
               <a:pPr/>
-              <a:t>2014-02-18</a:t>
+              <a:t>2014-02-19</a:t>
             </a:fld>
             <a:endParaRPr lang="fr-CA"/>
           </a:p>
@@ -4574,7 +4574,7 @@
     </p:spTree>
     <p:extLst>
       <p:ext uri="{BB962C8B-B14F-4D97-AF65-F5344CB8AC3E}">
-        <p14:creationId xmlns:p14="http://schemas.microsoft.com/office/powerpoint/2010/main" xmlns="" val="3652890964"/>
+        <p14:creationId xmlns="" xmlns:p14="http://schemas.microsoft.com/office/powerpoint/2010/main" val="3652890964"/>
       </p:ext>
     </p:extLst>
   </p:cSld>
@@ -4619,7 +4619,7 @@
             <a:fld id="{2CB6698F-CC9F-4277-8973-E5BAFD0BEC27}" type="datetimeFigureOut">
               <a:rPr lang="fr-CA" smtClean="0"/>
               <a:pPr/>
-              <a:t>2014-02-18</a:t>
+              <a:t>2014-02-19</a:t>
             </a:fld>
             <a:endParaRPr lang="fr-CA"/>
           </a:p>
@@ -4671,7 +4671,7 @@
     </p:spTree>
     <p:extLst>
       <p:ext uri="{BB962C8B-B14F-4D97-AF65-F5344CB8AC3E}">
-        <p14:creationId xmlns:p14="http://schemas.microsoft.com/office/powerpoint/2010/main" xmlns="" val="4150534248"/>
+        <p14:creationId xmlns="" xmlns:p14="http://schemas.microsoft.com/office/powerpoint/2010/main" val="4150534248"/>
       </p:ext>
     </p:extLst>
   </p:cSld>
@@ -4870,7 +4870,7 @@
             <a:fld id="{2CB6698F-CC9F-4277-8973-E5BAFD0BEC27}" type="datetimeFigureOut">
               <a:rPr lang="fr-CA" smtClean="0"/>
               <a:pPr/>
-              <a:t>2014-02-18</a:t>
+              <a:t>2014-02-19</a:t>
             </a:fld>
             <a:endParaRPr lang="fr-CA"/>
           </a:p>
@@ -4922,7 +4922,7 @@
     </p:spTree>
     <p:extLst>
       <p:ext uri="{BB962C8B-B14F-4D97-AF65-F5344CB8AC3E}">
-        <p14:creationId xmlns:p14="http://schemas.microsoft.com/office/powerpoint/2010/main" xmlns="" val="3515772684"/>
+        <p14:creationId xmlns="" xmlns:p14="http://schemas.microsoft.com/office/powerpoint/2010/main" val="3515772684"/>
       </p:ext>
     </p:extLst>
   </p:cSld>
@@ -5129,7 +5129,7 @@
             <a:fld id="{2CB6698F-CC9F-4277-8973-E5BAFD0BEC27}" type="datetimeFigureOut">
               <a:rPr lang="fr-CA" smtClean="0"/>
               <a:pPr/>
-              <a:t>2014-02-18</a:t>
+              <a:t>2014-02-19</a:t>
             </a:fld>
             <a:endParaRPr lang="fr-CA"/>
           </a:p>
@@ -5181,7 +5181,7 @@
     </p:spTree>
     <p:extLst>
       <p:ext uri="{BB962C8B-B14F-4D97-AF65-F5344CB8AC3E}">
-        <p14:creationId xmlns:p14="http://schemas.microsoft.com/office/powerpoint/2010/main" xmlns="" val="3433629741"/>
+        <p14:creationId xmlns="" xmlns:p14="http://schemas.microsoft.com/office/powerpoint/2010/main" val="3433629741"/>
       </p:ext>
     </p:extLst>
   </p:cSld>
@@ -5225,7 +5225,7 @@
           <a:blip r:embed="rId19" cstate="print">
             <a:extLst>
               <a:ext uri="{28A0092B-C50C-407E-A947-70E740481C1C}">
-                <a14:useLocalDpi xmlns:a14="http://schemas.microsoft.com/office/drawing/2010/main" xmlns="" val="0"/>
+                <a14:useLocalDpi xmlns="" xmlns:a14="http://schemas.microsoft.com/office/drawing/2010/main" val="0"/>
               </a:ext>
             </a:extLst>
           </a:blip>
@@ -5374,7 +5374,7 @@
             <a:fld id="{2CB6698F-CC9F-4277-8973-E5BAFD0BEC27}" type="datetimeFigureOut">
               <a:rPr lang="fr-CA" smtClean="0"/>
               <a:pPr/>
-              <a:t>2014-02-18</a:t>
+              <a:t>2014-02-19</a:t>
             </a:fld>
             <a:endParaRPr lang="fr-CA"/>
           </a:p>
@@ -5462,7 +5462,7 @@
     </p:spTree>
     <p:extLst>
       <p:ext uri="{BB962C8B-B14F-4D97-AF65-F5344CB8AC3E}">
-        <p14:creationId xmlns:p14="http://schemas.microsoft.com/office/powerpoint/2010/main" xmlns="" val="3154822747"/>
+        <p14:creationId xmlns="" xmlns:p14="http://schemas.microsoft.com/office/powerpoint/2010/main" val="3154822747"/>
       </p:ext>
     </p:extLst>
   </p:cSld>
@@ -5847,7 +5847,7 @@
     </p:spTree>
     <p:extLst>
       <p:ext uri="{BB962C8B-B14F-4D97-AF65-F5344CB8AC3E}">
-        <p14:creationId xmlns:p14="http://schemas.microsoft.com/office/powerpoint/2010/main" xmlns="" val="1783390830"/>
+        <p14:creationId xmlns="" xmlns:p14="http://schemas.microsoft.com/office/powerpoint/2010/main" val="1783390830"/>
       </p:ext>
     </p:extLst>
   </p:cSld>
@@ -5919,7 +5919,7 @@
     </p:spTree>
     <p:extLst>
       <p:ext uri="{BB962C8B-B14F-4D97-AF65-F5344CB8AC3E}">
-        <p14:creationId xmlns:p14="http://schemas.microsoft.com/office/powerpoint/2010/main" xmlns="" val="1502001153"/>
+        <p14:creationId xmlns="" xmlns:p14="http://schemas.microsoft.com/office/powerpoint/2010/main" val="1502001153"/>
       </p:ext>
     </p:extLst>
   </p:cSld>
@@ -5991,7 +5991,7 @@
     </p:spTree>
     <p:extLst>
       <p:ext uri="{BB962C8B-B14F-4D97-AF65-F5344CB8AC3E}">
-        <p14:creationId xmlns:p14="http://schemas.microsoft.com/office/powerpoint/2010/main" xmlns="" val="2532924102"/>
+        <p14:creationId xmlns="" xmlns:p14="http://schemas.microsoft.com/office/powerpoint/2010/main" val="2532924102"/>
       </p:ext>
     </p:extLst>
   </p:cSld>
@@ -6084,7 +6084,7 @@
     </p:spTree>
     <p:extLst>
       <p:ext uri="{BB962C8B-B14F-4D97-AF65-F5344CB8AC3E}">
-        <p14:creationId xmlns:p14="http://schemas.microsoft.com/office/powerpoint/2010/main" xmlns="" val="911911945"/>
+        <p14:creationId xmlns="" xmlns:p14="http://schemas.microsoft.com/office/powerpoint/2010/main" val="911911945"/>
       </p:ext>
     </p:extLst>
   </p:cSld>
@@ -6147,7 +6147,7 @@
         <p:spPr/>
         <p:txBody>
           <a:bodyPr>
-            <a:normAutofit/>
+            <a:normAutofit fontScale="92500" lnSpcReduction="20000"/>
           </a:bodyPr>
           <a:lstStyle/>
           <a:p>
@@ -6177,6 +6177,7 @@
               <a:rPr lang="fr-CA" dirty="0" smtClean="0"/>
               <a:t>Piano</a:t>
             </a:r>
+            <a:endParaRPr lang="fr-CA" dirty="0" smtClean="0"/>
           </a:p>
           <a:p>
             <a:r>
@@ -6216,7 +6217,51 @@
             <a:pPr lvl="2"/>
             <a:r>
               <a:rPr lang="fr-CA" dirty="0" smtClean="0"/>
-              <a:t>L’utilisateur à le plein contrôle</a:t>
+              <a:t>L’utilisateur à le plein </a:t>
+            </a:r>
+            <a:r>
+              <a:rPr lang="fr-CA" dirty="0" smtClean="0"/>
+              <a:t>contrôle</a:t>
+            </a:r>
+          </a:p>
+          <a:p>
+            <a:r>
+              <a:rPr lang="fr-CA" dirty="0" smtClean="0"/>
+              <a:t>Capteur</a:t>
+            </a:r>
+          </a:p>
+          <a:p>
+            <a:pPr lvl="1"/>
+            <a:r>
+              <a:rPr lang="fr-CA" dirty="0" err="1" smtClean="0"/>
+              <a:t>Kinect</a:t>
+            </a:r>
+            <a:endParaRPr lang="fr-CA" dirty="0" smtClean="0"/>
+          </a:p>
+          <a:p>
+            <a:pPr lvl="1"/>
+            <a:r>
+              <a:rPr lang="fr-CA" dirty="0" smtClean="0"/>
+              <a:t>Intel</a:t>
+            </a:r>
+          </a:p>
+          <a:p>
+            <a:pPr lvl="1"/>
+            <a:r>
+              <a:rPr lang="fr-CA" dirty="0" smtClean="0"/>
+              <a:t>PS </a:t>
+            </a:r>
+            <a:r>
+              <a:rPr lang="fr-CA" dirty="0" err="1" smtClean="0"/>
+              <a:t>Eye</a:t>
+            </a:r>
+            <a:r>
+              <a:rPr lang="fr-CA" dirty="0" smtClean="0"/>
+              <a:t> (</a:t>
+            </a:r>
+            <a:r>
+              <a:rPr lang="fr-CA" dirty="0" smtClean="0"/>
+              <a:t>Peut-être)</a:t>
             </a:r>
             <a:endParaRPr lang="fr-CA" dirty="0" smtClean="0"/>
           </a:p>
@@ -6225,7 +6270,7 @@
     </p:spTree>
     <p:extLst>
       <p:ext uri="{BB962C8B-B14F-4D97-AF65-F5344CB8AC3E}">
-        <p14:creationId xmlns:p14="http://schemas.microsoft.com/office/powerpoint/2010/main" xmlns="" val="981986339"/>
+        <p14:creationId xmlns="" xmlns:p14="http://schemas.microsoft.com/office/powerpoint/2010/main" val="981986339"/>
       </p:ext>
     </p:extLst>
   </p:cSld>
@@ -6301,8 +6346,20 @@
             <a:pPr lvl="1"/>
             <a:r>
               <a:rPr lang="fr-CA" dirty="0" smtClean="0"/>
-              <a:t>Explication du jeu et de son fonctionnement</a:t>
-            </a:r>
+              <a:t>Explication du jeu et de son </a:t>
+            </a:r>
+            <a:r>
+              <a:rPr lang="fr-CA" dirty="0" smtClean="0"/>
+              <a:t>fonctionnement</a:t>
+            </a:r>
+          </a:p>
+          <a:p>
+            <a:pPr lvl="1"/>
+            <a:r>
+              <a:rPr lang="fr-CA" dirty="0" smtClean="0"/>
+              <a:t>Explication des interactions (François)</a:t>
+            </a:r>
+            <a:endParaRPr lang="fr-CA" dirty="0" smtClean="0"/>
           </a:p>
           <a:p>
             <a:pPr lvl="1"/>
@@ -6960,7 +7017,7 @@
     </p:spTree>
     <p:extLst>
       <p:ext uri="{BB962C8B-B14F-4D97-AF65-F5344CB8AC3E}">
-        <p14:creationId xmlns:p14="http://schemas.microsoft.com/office/powerpoint/2010/main" xmlns="" val="981986339"/>
+        <p14:creationId xmlns="" xmlns:p14="http://schemas.microsoft.com/office/powerpoint/2010/main" val="981986339"/>
       </p:ext>
     </p:extLst>
   </p:cSld>
@@ -7060,7 +7117,7 @@
     </p:spTree>
     <p:extLst>
       <p:ext uri="{BB962C8B-B14F-4D97-AF65-F5344CB8AC3E}">
-        <p14:creationId xmlns:p14="http://schemas.microsoft.com/office/powerpoint/2010/main" xmlns="" val="43908559"/>
+        <p14:creationId xmlns="" xmlns:p14="http://schemas.microsoft.com/office/powerpoint/2010/main" val="43908559"/>
       </p:ext>
     </p:extLst>
   </p:cSld>
@@ -7140,7 +7197,7 @@
     </p:spTree>
     <p:extLst>
       <p:ext uri="{BB962C8B-B14F-4D97-AF65-F5344CB8AC3E}">
-        <p14:creationId xmlns:p14="http://schemas.microsoft.com/office/powerpoint/2010/main" xmlns="" val="3701052472"/>
+        <p14:creationId xmlns="" xmlns:p14="http://schemas.microsoft.com/office/powerpoint/2010/main" val="3701052472"/>
       </p:ext>
     </p:extLst>
   </p:cSld>
@@ -7212,7 +7269,7 @@
     </p:spTree>
     <p:extLst>
       <p:ext uri="{BB962C8B-B14F-4D97-AF65-F5344CB8AC3E}">
-        <p14:creationId xmlns:p14="http://schemas.microsoft.com/office/powerpoint/2010/main" xmlns="" val="956164830"/>
+        <p14:creationId xmlns="" xmlns:p14="http://schemas.microsoft.com/office/powerpoint/2010/main" val="956164830"/>
       </p:ext>
     </p:extLst>
   </p:cSld>
@@ -7284,7 +7341,7 @@
     </p:spTree>
     <p:extLst>
       <p:ext uri="{BB962C8B-B14F-4D97-AF65-F5344CB8AC3E}">
-        <p14:creationId xmlns:p14="http://schemas.microsoft.com/office/powerpoint/2010/main" xmlns="" val="1073507336"/>
+        <p14:creationId xmlns="" xmlns:p14="http://schemas.microsoft.com/office/powerpoint/2010/main" val="1073507336"/>
       </p:ext>
     </p:extLst>
   </p:cSld>
@@ -7356,7 +7413,7 @@
     </p:spTree>
     <p:extLst>
       <p:ext uri="{BB962C8B-B14F-4D97-AF65-F5344CB8AC3E}">
-        <p14:creationId xmlns:p14="http://schemas.microsoft.com/office/powerpoint/2010/main" xmlns="" val="3887991626"/>
+        <p14:creationId xmlns="" xmlns:p14="http://schemas.microsoft.com/office/powerpoint/2010/main" val="3887991626"/>
       </p:ext>
     </p:extLst>
   </p:cSld>
@@ -7630,7 +7687,7 @@
   <a:extraClrSchemeLst/>
   <a:extLst>
     <a:ext uri="{05A4C25C-085E-4340-85A3-A5531E510DB2}">
-      <thm15:themeFamily xmlns:thm15="http://schemas.microsoft.com/office/thememl/2012/main" xmlns="" name="Vapor Trail" id="{4FDF2955-7D9C-493C-B9F9-C205151B46CD}" vid="{8F31A783-2159-4870-BC29-2BA7D038EA44}"/>
+      <thm15:themeFamily xmlns="" xmlns:thm15="http://schemas.microsoft.com/office/thememl/2012/main" name="Vapor Trail" id="{4FDF2955-7D9C-493C-B9F9-C205151B46CD}" vid="{8F31A783-2159-4870-BC29-2BA7D038EA44}"/>
     </a:ext>
   </a:extLst>
 </a:theme>

</xml_diff>